<commit_message>
typo in flow chart
</commit_message>
<xml_diff>
--- a/images/custom_images.pptx
+++ b/images/custom_images.pptx
@@ -106,6 +106,11 @@
       </a:defRPr>
     </a:lvl9pPr>
   </p:defaultTextStyle>
+  <p:extLst>
+    <p:ext uri="{EFAFB233-063F-42B5-8137-9DF3F51BA10A}">
+      <p15:sldGuideLst xmlns:p15="http://schemas.microsoft.com/office/powerpoint/2012/main"/>
+    </p:ext>
+  </p:extLst>
 </p:presentation>
 </file>
 
@@ -564,7 +569,7 @@
           <a:p>
             <a:fld id="{30FF0B9A-4450-4B11-B85D-A095798D8C63}" type="datetimeFigureOut">
               <a:rPr lang="en-US" smtClean="0"/>
-              <a:t>4/16/2024</a:t>
+              <a:t>4/18/2024</a:t>
             </a:fld>
             <a:endParaRPr lang="en-US"/>
           </a:p>
@@ -762,7 +767,7 @@
           <a:p>
             <a:fld id="{30FF0B9A-4450-4B11-B85D-A095798D8C63}" type="datetimeFigureOut">
               <a:rPr lang="en-US" smtClean="0"/>
-              <a:t>4/16/2024</a:t>
+              <a:t>4/18/2024</a:t>
             </a:fld>
             <a:endParaRPr lang="en-US"/>
           </a:p>
@@ -970,7 +975,7 @@
           <a:p>
             <a:fld id="{30FF0B9A-4450-4B11-B85D-A095798D8C63}" type="datetimeFigureOut">
               <a:rPr lang="en-US" smtClean="0"/>
-              <a:t>4/16/2024</a:t>
+              <a:t>4/18/2024</a:t>
             </a:fld>
             <a:endParaRPr lang="en-US"/>
           </a:p>
@@ -1168,7 +1173,7 @@
           <a:p>
             <a:fld id="{30FF0B9A-4450-4B11-B85D-A095798D8C63}" type="datetimeFigureOut">
               <a:rPr lang="en-US" smtClean="0"/>
-              <a:t>4/16/2024</a:t>
+              <a:t>4/18/2024</a:t>
             </a:fld>
             <a:endParaRPr lang="en-US"/>
           </a:p>
@@ -1443,7 +1448,7 @@
           <a:p>
             <a:fld id="{30FF0B9A-4450-4B11-B85D-A095798D8C63}" type="datetimeFigureOut">
               <a:rPr lang="en-US" smtClean="0"/>
-              <a:t>4/16/2024</a:t>
+              <a:t>4/18/2024</a:t>
             </a:fld>
             <a:endParaRPr lang="en-US"/>
           </a:p>
@@ -1708,7 +1713,7 @@
           <a:p>
             <a:fld id="{30FF0B9A-4450-4B11-B85D-A095798D8C63}" type="datetimeFigureOut">
               <a:rPr lang="en-US" smtClean="0"/>
-              <a:t>4/16/2024</a:t>
+              <a:t>4/18/2024</a:t>
             </a:fld>
             <a:endParaRPr lang="en-US"/>
           </a:p>
@@ -2120,7 +2125,7 @@
           <a:p>
             <a:fld id="{30FF0B9A-4450-4B11-B85D-A095798D8C63}" type="datetimeFigureOut">
               <a:rPr lang="en-US" smtClean="0"/>
-              <a:t>4/16/2024</a:t>
+              <a:t>4/18/2024</a:t>
             </a:fld>
             <a:endParaRPr lang="en-US"/>
           </a:p>
@@ -2261,7 +2266,7 @@
           <a:p>
             <a:fld id="{30FF0B9A-4450-4B11-B85D-A095798D8C63}" type="datetimeFigureOut">
               <a:rPr lang="en-US" smtClean="0"/>
-              <a:t>4/16/2024</a:t>
+              <a:t>4/18/2024</a:t>
             </a:fld>
             <a:endParaRPr lang="en-US"/>
           </a:p>
@@ -2374,7 +2379,7 @@
           <a:p>
             <a:fld id="{30FF0B9A-4450-4B11-B85D-A095798D8C63}" type="datetimeFigureOut">
               <a:rPr lang="en-US" smtClean="0"/>
-              <a:t>4/16/2024</a:t>
+              <a:t>4/18/2024</a:t>
             </a:fld>
             <a:endParaRPr lang="en-US"/>
           </a:p>
@@ -2685,7 +2690,7 @@
           <a:p>
             <a:fld id="{30FF0B9A-4450-4B11-B85D-A095798D8C63}" type="datetimeFigureOut">
               <a:rPr lang="en-US" smtClean="0"/>
-              <a:t>4/16/2024</a:t>
+              <a:t>4/18/2024</a:t>
             </a:fld>
             <a:endParaRPr lang="en-US"/>
           </a:p>
@@ -2973,7 +2978,7 @@
           <a:p>
             <a:fld id="{30FF0B9A-4450-4B11-B85D-A095798D8C63}" type="datetimeFigureOut">
               <a:rPr lang="en-US" smtClean="0"/>
-              <a:t>4/16/2024</a:t>
+              <a:t>4/18/2024</a:t>
             </a:fld>
             <a:endParaRPr lang="en-US"/>
           </a:p>
@@ -3214,7 +3219,7 @@
           <a:p>
             <a:fld id="{30FF0B9A-4450-4B11-B85D-A095798D8C63}" type="datetimeFigureOut">
               <a:rPr lang="en-US" smtClean="0"/>
-              <a:t>4/16/2024</a:t>
+              <a:t>4/18/2024</a:t>
             </a:fld>
             <a:endParaRPr lang="en-US"/>
           </a:p>
@@ -3836,8 +3841,27 @@
                 <a:ea typeface="Liberation Sans" panose="020B0604020202020204" pitchFamily="34" charset="0"/>
                 <a:cs typeface="Liberation Sans" panose="020B0604020202020204" pitchFamily="34" charset="0"/>
               </a:rPr>
-              <a:t>Uncertainty indicators from NOAA NPWs</a:t>
-            </a:r>
+              <a:t>Uncertainty indicators from </a:t>
+            </a:r>
+            <a:r>
+              <a:rPr lang="en-US">
+                <a:solidFill>
+                  <a:schemeClr val="tx1"/>
+                </a:solidFill>
+                <a:latin typeface="Liberation Sans" panose="020B0604020202020204" pitchFamily="34" charset="0"/>
+                <a:ea typeface="Liberation Sans" panose="020B0604020202020204" pitchFamily="34" charset="0"/>
+                <a:cs typeface="Liberation Sans" panose="020B0604020202020204" pitchFamily="34" charset="0"/>
+              </a:rPr>
+              <a:t>NOAA NWPs</a:t>
+            </a:r>
+            <a:endParaRPr lang="en-US" dirty="0">
+              <a:solidFill>
+                <a:schemeClr val="tx1"/>
+              </a:solidFill>
+              <a:latin typeface="Liberation Sans" panose="020B0604020202020204" pitchFamily="34" charset="0"/>
+              <a:ea typeface="Liberation Sans" panose="020B0604020202020204" pitchFamily="34" charset="0"/>
+              <a:cs typeface="Liberation Sans" panose="020B0604020202020204" pitchFamily="34" charset="0"/>
+            </a:endParaRPr>
           </a:p>
         </p:txBody>
       </p:sp>
@@ -4596,8 +4620,8 @@
           </a:prstGeom>
         </p:spPr>
       </p:pic>
-      <mc:AlternateContent xmlns:mc="http://schemas.openxmlformats.org/markup-compatibility/2006">
-        <mc:Choice xmlns:p14="http://schemas.microsoft.com/office/powerpoint/2010/main" Requires="p14">
+      <mc:AlternateContent xmlns:mc="http://schemas.openxmlformats.org/markup-compatibility/2006" xmlns:p14="http://schemas.microsoft.com/office/powerpoint/2010/main">
+        <mc:Choice Requires="p14">
           <p:contentPart p14:bwMode="auto" r:id="rId3">
             <p14:nvContentPartPr>
               <p14:cNvPr id="10" name="Ink 9">
@@ -4616,7 +4640,7 @@
             </p14:xfrm>
           </p:contentPart>
         </mc:Choice>
-        <mc:Fallback>
+        <mc:Fallback xmlns="">
           <p:pic>
             <p:nvPicPr>
               <p:cNvPr id="10" name="Ink 9">
@@ -4667,8 +4691,8 @@
             <a:chExt cx="2814098" cy="1266004"/>
           </a:xfrm>
         </p:grpSpPr>
-        <mc:AlternateContent xmlns:mc="http://schemas.openxmlformats.org/markup-compatibility/2006">
-          <mc:Choice xmlns:p14="http://schemas.microsoft.com/office/powerpoint/2010/main" Requires="p14">
+        <mc:AlternateContent xmlns:mc="http://schemas.openxmlformats.org/markup-compatibility/2006" xmlns:p14="http://schemas.microsoft.com/office/powerpoint/2010/main">
+          <mc:Choice Requires="p14">
             <p:contentPart p14:bwMode="auto" r:id="rId5">
               <p14:nvContentPartPr>
                 <p14:cNvPr id="13" name="Ink 12">
@@ -4687,7 +4711,7 @@
               </p14:xfrm>
             </p:contentPart>
           </mc:Choice>
-          <mc:Fallback>
+          <mc:Fallback xmlns="">
             <p:pic>
               <p:nvPicPr>
                 <p:cNvPr id="13" name="Ink 12">
@@ -4718,8 +4742,8 @@
             </p:pic>
           </mc:Fallback>
         </mc:AlternateContent>
-        <mc:AlternateContent xmlns:mc="http://schemas.openxmlformats.org/markup-compatibility/2006">
-          <mc:Choice xmlns:p14="http://schemas.microsoft.com/office/powerpoint/2010/main" Requires="p14">
+        <mc:AlternateContent xmlns:mc="http://schemas.openxmlformats.org/markup-compatibility/2006" xmlns:p14="http://schemas.microsoft.com/office/powerpoint/2010/main">
+          <mc:Choice Requires="p14">
             <p:contentPart p14:bwMode="auto" r:id="rId7">
               <p14:nvContentPartPr>
                 <p14:cNvPr id="14" name="Ink 13">
@@ -4738,7 +4762,7 @@
               </p14:xfrm>
             </p:contentPart>
           </mc:Choice>
-          <mc:Fallback>
+          <mc:Fallback xmlns="">
             <p:pic>
               <p:nvPicPr>
                 <p:cNvPr id="14" name="Ink 13">
@@ -4870,8 +4894,8 @@
           </a:prstGeom>
         </p:spPr>
       </p:pic>
-      <mc:AlternateContent xmlns:mc="http://schemas.openxmlformats.org/markup-compatibility/2006">
-        <mc:Choice xmlns:p14="http://schemas.microsoft.com/office/powerpoint/2010/main" Requires="p14">
+      <mc:AlternateContent xmlns:mc="http://schemas.openxmlformats.org/markup-compatibility/2006" xmlns:p14="http://schemas.microsoft.com/office/powerpoint/2010/main">
+        <mc:Choice Requires="p14">
           <p:contentPart p14:bwMode="auto" r:id="rId11">
             <p14:nvContentPartPr>
               <p14:cNvPr id="37" name="Ink 36">
@@ -4890,7 +4914,7 @@
             </p14:xfrm>
           </p:contentPart>
         </mc:Choice>
-        <mc:Fallback>
+        <mc:Fallback xmlns="">
           <p:pic>
             <p:nvPicPr>
               <p:cNvPr id="37" name="Ink 36">
@@ -4921,8 +4945,8 @@
           </p:pic>
         </mc:Fallback>
       </mc:AlternateContent>
-      <mc:AlternateContent xmlns:mc="http://schemas.openxmlformats.org/markup-compatibility/2006">
-        <mc:Choice xmlns:p14="http://schemas.microsoft.com/office/powerpoint/2010/main" Requires="p14">
+      <mc:AlternateContent xmlns:mc="http://schemas.openxmlformats.org/markup-compatibility/2006" xmlns:p14="http://schemas.microsoft.com/office/powerpoint/2010/main">
+        <mc:Choice Requires="p14">
           <p:contentPart p14:bwMode="auto" r:id="rId13">
             <p14:nvContentPartPr>
               <p14:cNvPr id="38" name="Ink 37">
@@ -4941,7 +4965,7 @@
             </p14:xfrm>
           </p:contentPart>
         </mc:Choice>
-        <mc:Fallback>
+        <mc:Fallback xmlns="">
           <p:pic>
             <p:nvPicPr>
               <p:cNvPr id="38" name="Ink 37">
@@ -4972,8 +4996,8 @@
           </p:pic>
         </mc:Fallback>
       </mc:AlternateContent>
-      <mc:AlternateContent xmlns:mc="http://schemas.openxmlformats.org/markup-compatibility/2006">
-        <mc:Choice xmlns:p14="http://schemas.microsoft.com/office/powerpoint/2010/main" Requires="p14">
+      <mc:AlternateContent xmlns:mc="http://schemas.openxmlformats.org/markup-compatibility/2006" xmlns:p14="http://schemas.microsoft.com/office/powerpoint/2010/main">
+        <mc:Choice Requires="p14">
           <p:contentPart p14:bwMode="auto" r:id="rId15">
             <p14:nvContentPartPr>
               <p14:cNvPr id="39" name="Ink 38">
@@ -4992,7 +5016,7 @@
             </p14:xfrm>
           </p:contentPart>
         </mc:Choice>
-        <mc:Fallback>
+        <mc:Fallback xmlns="">
           <p:pic>
             <p:nvPicPr>
               <p:cNvPr id="39" name="Ink 38">
@@ -5023,8 +5047,8 @@
           </p:pic>
         </mc:Fallback>
       </mc:AlternateContent>
-      <mc:AlternateContent xmlns:mc="http://schemas.openxmlformats.org/markup-compatibility/2006">
-        <mc:Choice xmlns:p14="http://schemas.microsoft.com/office/powerpoint/2010/main" Requires="p14">
+      <mc:AlternateContent xmlns:mc="http://schemas.openxmlformats.org/markup-compatibility/2006" xmlns:p14="http://schemas.microsoft.com/office/powerpoint/2010/main">
+        <mc:Choice Requires="p14">
           <p:contentPart p14:bwMode="auto" r:id="rId17">
             <p14:nvContentPartPr>
               <p14:cNvPr id="40" name="Ink 39">
@@ -5043,7 +5067,7 @@
             </p14:xfrm>
           </p:contentPart>
         </mc:Choice>
-        <mc:Fallback>
+        <mc:Fallback xmlns="">
           <p:pic>
             <p:nvPicPr>
               <p:cNvPr id="40" name="Ink 39">
@@ -5074,8 +5098,8 @@
           </p:pic>
         </mc:Fallback>
       </mc:AlternateContent>
-      <mc:AlternateContent xmlns:mc="http://schemas.openxmlformats.org/markup-compatibility/2006">
-        <mc:Choice xmlns:p14="http://schemas.microsoft.com/office/powerpoint/2010/main" Requires="p14">
+      <mc:AlternateContent xmlns:mc="http://schemas.openxmlformats.org/markup-compatibility/2006" xmlns:p14="http://schemas.microsoft.com/office/powerpoint/2010/main">
+        <mc:Choice Requires="p14">
           <p:contentPart p14:bwMode="auto" r:id="rId19">
             <p14:nvContentPartPr>
               <p14:cNvPr id="41" name="Ink 40">
@@ -5094,7 +5118,7 @@
             </p14:xfrm>
           </p:contentPart>
         </mc:Choice>
-        <mc:Fallback>
+        <mc:Fallback xmlns="">
           <p:pic>
             <p:nvPicPr>
               <p:cNvPr id="41" name="Ink 40">
@@ -5125,8 +5149,8 @@
           </p:pic>
         </mc:Fallback>
       </mc:AlternateContent>
-      <mc:AlternateContent xmlns:mc="http://schemas.openxmlformats.org/markup-compatibility/2006">
-        <mc:Choice xmlns:p14="http://schemas.microsoft.com/office/powerpoint/2010/main" Requires="p14">
+      <mc:AlternateContent xmlns:mc="http://schemas.openxmlformats.org/markup-compatibility/2006" xmlns:p14="http://schemas.microsoft.com/office/powerpoint/2010/main">
+        <mc:Choice Requires="p14">
           <p:contentPart p14:bwMode="auto" r:id="rId21">
             <p14:nvContentPartPr>
               <p14:cNvPr id="42" name="Ink 41">
@@ -5145,7 +5169,7 @@
             </p14:xfrm>
           </p:contentPart>
         </mc:Choice>
-        <mc:Fallback>
+        <mc:Fallback xmlns="">
           <p:pic>
             <p:nvPicPr>
               <p:cNvPr id="42" name="Ink 41">
@@ -5176,8 +5200,8 @@
           </p:pic>
         </mc:Fallback>
       </mc:AlternateContent>
-      <mc:AlternateContent xmlns:mc="http://schemas.openxmlformats.org/markup-compatibility/2006">
-        <mc:Choice xmlns:p14="http://schemas.microsoft.com/office/powerpoint/2010/main" Requires="p14">
+      <mc:AlternateContent xmlns:mc="http://schemas.openxmlformats.org/markup-compatibility/2006" xmlns:p14="http://schemas.microsoft.com/office/powerpoint/2010/main">
+        <mc:Choice Requires="p14">
           <p:contentPart p14:bwMode="auto" r:id="rId23">
             <p14:nvContentPartPr>
               <p14:cNvPr id="43" name="Ink 42">
@@ -5196,7 +5220,7 @@
             </p14:xfrm>
           </p:contentPart>
         </mc:Choice>
-        <mc:Fallback>
+        <mc:Fallback xmlns="">
           <p:pic>
             <p:nvPicPr>
               <p:cNvPr id="43" name="Ink 42">
@@ -5227,8 +5251,8 @@
           </p:pic>
         </mc:Fallback>
       </mc:AlternateContent>
-      <mc:AlternateContent xmlns:mc="http://schemas.openxmlformats.org/markup-compatibility/2006">
-        <mc:Choice xmlns:p14="http://schemas.microsoft.com/office/powerpoint/2010/main" Requires="p14">
+      <mc:AlternateContent xmlns:mc="http://schemas.openxmlformats.org/markup-compatibility/2006" xmlns:p14="http://schemas.microsoft.com/office/powerpoint/2010/main">
+        <mc:Choice Requires="p14">
           <p:contentPart p14:bwMode="auto" r:id="rId25">
             <p14:nvContentPartPr>
               <p14:cNvPr id="44" name="Ink 43">
@@ -5247,7 +5271,7 @@
             </p14:xfrm>
           </p:contentPart>
         </mc:Choice>
-        <mc:Fallback>
+        <mc:Fallback xmlns="">
           <p:pic>
             <p:nvPicPr>
               <p:cNvPr id="44" name="Ink 43">

</xml_diff>